<commit_message>
updated powerpoint, added images folder.
</commit_message>
<xml_diff>
--- a/Powerpoint.pptx
+++ b/Powerpoint.pptx
@@ -17,8 +17,8 @@
     <p:sldId id="262" r:id="rId8"/>
     <p:sldId id="270" r:id="rId9"/>
     <p:sldId id="264" r:id="rId10"/>
-    <p:sldId id="272" r:id="rId11"/>
-    <p:sldId id="269" r:id="rId12"/>
+    <p:sldId id="273" r:id="rId11"/>
+    <p:sldId id="272" r:id="rId12"/>
     <p:sldId id="271" r:id="rId13"/>
   </p:sldIdLst>
   <p:sldSz cx="12192000" cy="6858000"/>
@@ -9722,6 +9722,36 @@
           </a:p>
         </p:txBody>
       </p:sp>
+      <p:pic>
+        <p:nvPicPr>
+          <p:cNvPr id="5" name="Picture 4" descr="A person looking at a screen with graphs&#10;&#10;Description automatically generated">
+            <a:extLst>
+              <a:ext uri="{FF2B5EF4-FFF2-40B4-BE49-F238E27FC236}">
+                <a16:creationId xmlns:a16="http://schemas.microsoft.com/office/drawing/2014/main" id="{31C3A1A4-47C2-B7D6-5602-F6BD8AE5066A}"/>
+              </a:ext>
+            </a:extLst>
+          </p:cNvPr>
+          <p:cNvPicPr>
+            <a:picLocks noChangeAspect="1"/>
+          </p:cNvPicPr>
+          <p:nvPr/>
+        </p:nvPicPr>
+        <p:blipFill>
+          <a:blip r:embed="rId3"/>
+          <a:stretch>
+            <a:fillRect/>
+          </a:stretch>
+        </p:blipFill>
+        <p:spPr>
+          <a:xfrm>
+            <a:off x="521856" y="1657054"/>
+            <a:ext cx="5755639" cy="3229854"/>
+          </a:xfrm>
+          <a:prstGeom prst="rect">
+            <a:avLst/>
+          </a:prstGeom>
+        </p:spPr>
+      </p:pic>
     </p:spTree>
     <p:extLst>
       <p:ext uri="{BB962C8B-B14F-4D97-AF65-F5344CB8AC3E}">
@@ -9921,6 +9951,36 @@
           </a:p>
         </p:txBody>
       </p:sp>
+      <p:pic>
+        <p:nvPicPr>
+          <p:cNvPr id="8" name="Picture 7" descr="A close-up of a signpost&#10;&#10;Description automatically generated">
+            <a:extLst>
+              <a:ext uri="{FF2B5EF4-FFF2-40B4-BE49-F238E27FC236}">
+                <a16:creationId xmlns:a16="http://schemas.microsoft.com/office/drawing/2014/main" id="{A7A2F215-601F-A676-2DCE-320DB3426D88}"/>
+              </a:ext>
+            </a:extLst>
+          </p:cNvPr>
+          <p:cNvPicPr>
+            <a:picLocks noChangeAspect="1"/>
+          </p:cNvPicPr>
+          <p:nvPr/>
+        </p:nvPicPr>
+        <p:blipFill>
+          <a:blip r:embed="rId2"/>
+          <a:stretch>
+            <a:fillRect/>
+          </a:stretch>
+        </p:blipFill>
+        <p:spPr>
+          <a:xfrm>
+            <a:off x="5536305" y="1050869"/>
+            <a:ext cx="5366642" cy="4024983"/>
+          </a:xfrm>
+          <a:prstGeom prst="rect">
+            <a:avLst/>
+          </a:prstGeom>
+        </p:spPr>
+      </p:pic>
     </p:spTree>
     <p:extLst>
       <p:ext uri="{BB962C8B-B14F-4D97-AF65-F5344CB8AC3E}">
@@ -10142,6 +10202,36 @@
           </a:p>
         </p:txBody>
       </p:sp>
+      <p:pic>
+        <p:nvPicPr>
+          <p:cNvPr id="8" name="Picture 7" descr="A puzzle piece with a question mark drawn on it&#10;&#10;Description automatically generated">
+            <a:extLst>
+              <a:ext uri="{FF2B5EF4-FFF2-40B4-BE49-F238E27FC236}">
+                <a16:creationId xmlns:a16="http://schemas.microsoft.com/office/drawing/2014/main" id="{7E1D8B00-5082-8753-85D7-B4FCF41B297E}"/>
+              </a:ext>
+            </a:extLst>
+          </p:cNvPr>
+          <p:cNvPicPr>
+            <a:picLocks noChangeAspect="1"/>
+          </p:cNvPicPr>
+          <p:nvPr/>
+        </p:nvPicPr>
+        <p:blipFill>
+          <a:blip r:embed="rId2"/>
+          <a:stretch>
+            <a:fillRect/>
+          </a:stretch>
+        </p:blipFill>
+        <p:spPr>
+          <a:xfrm>
+            <a:off x="6096000" y="1933574"/>
+            <a:ext cx="5596642" cy="3152775"/>
+          </a:xfrm>
+          <a:prstGeom prst="rect">
+            <a:avLst/>
+          </a:prstGeom>
+        </p:spPr>
+      </p:pic>
     </p:spTree>
     <p:extLst>
       <p:ext uri="{BB962C8B-B14F-4D97-AF65-F5344CB8AC3E}">
@@ -10233,7 +10323,7 @@
           <a:p>
             <a:r>
               <a:rPr lang="en-US" dirty="0"/>
-              <a:t>We pulled the entire stock history for each of the companies from the Alpha Advantage API and converted the pulled data into easy-to-read csv files.</a:t>
+              <a:t>We pulled the entire available stock history for each of the companies from the Alpha Advantage API and converted the pulled data into easy-to-read csv files.</a:t>
             </a:r>
           </a:p>
           <a:p>
@@ -10242,11 +10332,71 @@
           <a:p>
             <a:r>
               <a:rPr lang="en-US" dirty="0"/>
-              <a:t>(we compared over 1800 ticker values)</a:t>
-            </a:r>
-          </a:p>
-        </p:txBody>
-      </p:sp>
+              <a:t>(we compared over 1800 values)</a:t>
+            </a:r>
+          </a:p>
+        </p:txBody>
+      </p:sp>
+      <p:pic>
+        <p:nvPicPr>
+          <p:cNvPr id="5" name="Picture 4" descr="A logo with a green dot&#10;&#10;Description automatically generated with medium confidence">
+            <a:extLst>
+              <a:ext uri="{FF2B5EF4-FFF2-40B4-BE49-F238E27FC236}">
+                <a16:creationId xmlns:a16="http://schemas.microsoft.com/office/drawing/2014/main" id="{30F3FE19-E842-1DB8-17B2-C0C2FA4D1A52}"/>
+              </a:ext>
+            </a:extLst>
+          </p:cNvPr>
+          <p:cNvPicPr>
+            <a:picLocks noChangeAspect="1"/>
+          </p:cNvPicPr>
+          <p:nvPr/>
+        </p:nvPicPr>
+        <p:blipFill>
+          <a:blip r:embed="rId2"/>
+          <a:stretch>
+            <a:fillRect/>
+          </a:stretch>
+        </p:blipFill>
+        <p:spPr>
+          <a:xfrm>
+            <a:off x="866775" y="733438"/>
+            <a:ext cx="5191125" cy="2920008"/>
+          </a:xfrm>
+          <a:prstGeom prst="rect">
+            <a:avLst/>
+          </a:prstGeom>
+        </p:spPr>
+      </p:pic>
+      <p:pic>
+        <p:nvPicPr>
+          <p:cNvPr id="7" name="Picture 6" descr="A table with numbers and numbers&#10;&#10;Description automatically generated">
+            <a:extLst>
+              <a:ext uri="{FF2B5EF4-FFF2-40B4-BE49-F238E27FC236}">
+                <a16:creationId xmlns:a16="http://schemas.microsoft.com/office/drawing/2014/main" id="{B9FC83BA-DC29-0838-D8A2-C371EA8382E2}"/>
+              </a:ext>
+            </a:extLst>
+          </p:cNvPr>
+          <p:cNvPicPr>
+            <a:picLocks noChangeAspect="1"/>
+          </p:cNvPicPr>
+          <p:nvPr/>
+        </p:nvPicPr>
+        <p:blipFill>
+          <a:blip r:embed="rId3"/>
+          <a:stretch>
+            <a:fillRect/>
+          </a:stretch>
+        </p:blipFill>
+        <p:spPr>
+          <a:xfrm>
+            <a:off x="1619399" y="3864371"/>
+            <a:ext cx="3685875" cy="2670212"/>
+          </a:xfrm>
+          <a:prstGeom prst="rect">
+            <a:avLst/>
+          </a:prstGeom>
+        </p:spPr>
+      </p:pic>
     </p:spTree>
     <p:extLst>
       <p:ext uri="{BB962C8B-B14F-4D97-AF65-F5344CB8AC3E}">
@@ -10605,12 +10755,42 @@
           </a:p>
         </p:txBody>
       </p:sp>
-      <p:sp>
-        <p:nvSpPr>
-          <p:cNvPr id="43" name="TextBox 42">
-            <a:extLst>
-              <a:ext uri="{FF2B5EF4-FFF2-40B4-BE49-F238E27FC236}">
-                <a16:creationId xmlns:a16="http://schemas.microsoft.com/office/drawing/2014/main" id="{E4B1152D-1212-8A7A-FD15-DD3A40D6238A}"/>
+      <p:pic>
+        <p:nvPicPr>
+          <p:cNvPr id="4" name="Picture 3" descr="A graph with blue dots and red line&#10;&#10;Description automatically generated">
+            <a:extLst>
+              <a:ext uri="{FF2B5EF4-FFF2-40B4-BE49-F238E27FC236}">
+                <a16:creationId xmlns:a16="http://schemas.microsoft.com/office/drawing/2014/main" id="{CED44DC4-1D1A-368B-42E3-4E728CCB576A}"/>
+              </a:ext>
+            </a:extLst>
+          </p:cNvPr>
+          <p:cNvPicPr>
+            <a:picLocks noChangeAspect="1"/>
+          </p:cNvPicPr>
+          <p:nvPr/>
+        </p:nvPicPr>
+        <p:blipFill>
+          <a:blip r:embed="rId2"/>
+          <a:stretch>
+            <a:fillRect/>
+          </a:stretch>
+        </p:blipFill>
+        <p:spPr>
+          <a:xfrm>
+            <a:off x="1307008" y="2948940"/>
+            <a:ext cx="4498404" cy="3373803"/>
+          </a:xfrm>
+          <a:prstGeom prst="rect">
+            <a:avLst/>
+          </a:prstGeom>
+        </p:spPr>
+      </p:pic>
+      <p:sp>
+        <p:nvSpPr>
+          <p:cNvPr id="5" name="TextBox 4">
+            <a:extLst>
+              <a:ext uri="{FF2B5EF4-FFF2-40B4-BE49-F238E27FC236}">
+                <a16:creationId xmlns:a16="http://schemas.microsoft.com/office/drawing/2014/main" id="{2254930C-D835-67EE-67EE-F1F5BDA45880}"/>
               </a:ext>
             </a:extLst>
           </p:cNvPr>
@@ -10619,8 +10799,8 @@
         </p:nvSpPr>
         <p:spPr>
           <a:xfrm>
-            <a:off x="1307008" y="2281727"/>
-            <a:ext cx="9577983" cy="523220"/>
+            <a:off x="1856232" y="2446020"/>
+            <a:ext cx="3520440" cy="523220"/>
           </a:xfrm>
           <a:prstGeom prst="rect">
             <a:avLst/>
@@ -10633,10 +10813,84 @@
           </a:bodyPr>
           <a:lstStyle/>
           <a:p>
+            <a:pPr algn="ctr"/>
             <a:r>
               <a:rPr lang="en-US" sz="2800" dirty="0"/>
-              <a:t>Text</a:t>
-            </a:r>
+              <a:t>AbbVie Inc</a:t>
+            </a:r>
+          </a:p>
+        </p:txBody>
+      </p:sp>
+      <p:pic>
+        <p:nvPicPr>
+          <p:cNvPr id="7" name="Picture 6" descr="A graph with numbers and dots&#10;&#10;Description automatically generated">
+            <a:extLst>
+              <a:ext uri="{FF2B5EF4-FFF2-40B4-BE49-F238E27FC236}">
+                <a16:creationId xmlns:a16="http://schemas.microsoft.com/office/drawing/2014/main" id="{78F7721C-CC3A-DC1E-99A4-7541D84AE9A6}"/>
+              </a:ext>
+            </a:extLst>
+          </p:cNvPr>
+          <p:cNvPicPr>
+            <a:picLocks noChangeAspect="1"/>
+          </p:cNvPicPr>
+          <p:nvPr/>
+        </p:nvPicPr>
+        <p:blipFill>
+          <a:blip r:embed="rId3"/>
+          <a:stretch>
+            <a:fillRect/>
+          </a:stretch>
+        </p:blipFill>
+        <p:spPr>
+          <a:xfrm>
+            <a:off x="6460235" y="3008495"/>
+            <a:ext cx="4463807" cy="3347855"/>
+          </a:xfrm>
+          <a:prstGeom prst="rect">
+            <a:avLst/>
+          </a:prstGeom>
+        </p:spPr>
+      </p:pic>
+      <p:sp>
+        <p:nvSpPr>
+          <p:cNvPr id="8" name="TextBox 7">
+            <a:extLst>
+              <a:ext uri="{FF2B5EF4-FFF2-40B4-BE49-F238E27FC236}">
+                <a16:creationId xmlns:a16="http://schemas.microsoft.com/office/drawing/2014/main" id="{3FDF9D8D-C677-0576-3FE3-CC3578FA803A}"/>
+              </a:ext>
+            </a:extLst>
+          </p:cNvPr>
+          <p:cNvSpPr txBox="1"/>
+          <p:nvPr/>
+        </p:nvSpPr>
+        <p:spPr>
+          <a:xfrm>
+            <a:off x="6931918" y="2166316"/>
+            <a:ext cx="3520440" cy="954107"/>
+          </a:xfrm>
+          <a:prstGeom prst="rect">
+            <a:avLst/>
+          </a:prstGeom>
+          <a:noFill/>
+        </p:spPr>
+        <p:txBody>
+          <a:bodyPr wrap="square" rtlCol="0">
+            <a:spAutoFit/>
+          </a:bodyPr>
+          <a:lstStyle/>
+          <a:p>
+            <a:pPr algn="ctr"/>
+            <a:r>
+              <a:rPr lang="en-US" sz="2800" b="0" i="0" dirty="0">
+                <a:solidFill>
+                  <a:srgbClr val="202124"/>
+                </a:solidFill>
+                <a:effectLst/>
+                <a:latin typeface="Google Sans"/>
+              </a:rPr>
+              <a:t>Bristol-Myers Squibb Co</a:t>
+            </a:r>
+            <a:endParaRPr lang="en-US" sz="2800" dirty="0"/>
           </a:p>
         </p:txBody>
       </p:sp>
@@ -10675,7 +10929,7 @@
           <p:cNvPr id="2" name="Title 1">
             <a:extLst>
               <a:ext uri="{FF2B5EF4-FFF2-40B4-BE49-F238E27FC236}">
-                <a16:creationId xmlns:a16="http://schemas.microsoft.com/office/drawing/2014/main" id="{D7370F17-7C63-2740-3929-5264F9B06095}"/>
+                <a16:creationId xmlns:a16="http://schemas.microsoft.com/office/drawing/2014/main" id="{4F6A2D15-4D68-4BF7-9421-032AE6C8852C}"/>
               </a:ext>
             </a:extLst>
           </p:cNvPr>
@@ -10686,77 +10940,86 @@
             <p:ph type="title"/>
           </p:nvPr>
         </p:nvSpPr>
-        <p:spPr/>
+        <p:spPr>
+          <a:xfrm>
+            <a:off x="1307008" y="336701"/>
+            <a:ext cx="9577983" cy="1325563"/>
+          </a:xfrm>
+        </p:spPr>
         <p:txBody>
           <a:bodyPr/>
           <a:lstStyle/>
           <a:p>
             <a:r>
               <a:rPr lang="en-US" dirty="0"/>
-              <a:t>How can we predict future trends?</a:t>
-            </a:r>
-            <a:br>
-              <a:rPr lang="en-US" dirty="0"/>
-            </a:br>
-            <a:endParaRPr lang="en-US" dirty="0"/>
-          </a:p>
-        </p:txBody>
-      </p:sp>
-      <p:sp>
-        <p:nvSpPr>
-          <p:cNvPr id="3" name="SmartArt Placeholder 2">
-            <a:extLst>
-              <a:ext uri="{FF2B5EF4-FFF2-40B4-BE49-F238E27FC236}">
-                <a16:creationId xmlns:a16="http://schemas.microsoft.com/office/drawing/2014/main" id="{204115AA-6716-606A-E787-021915C3FAAB}"/>
-              </a:ext>
-            </a:extLst>
-          </p:cNvPr>
-          <p:cNvSpPr>
-            <a:spLocks noGrp="1"/>
-          </p:cNvSpPr>
-          <p:nvPr>
-            <p:ph type="dgm" sz="quarter" idx="15"/>
-          </p:nvPr>
-        </p:nvSpPr>
-        <p:spPr/>
+              <a:t>How have the stock trends performed over time?</a:t>
+            </a:r>
+          </a:p>
+        </p:txBody>
+      </p:sp>
+      <p:sp>
+        <p:nvSpPr>
+          <p:cNvPr id="23" name="Date Placeholder 22">
+            <a:extLst>
+              <a:ext uri="{FF2B5EF4-FFF2-40B4-BE49-F238E27FC236}">
+                <a16:creationId xmlns:a16="http://schemas.microsoft.com/office/drawing/2014/main" id="{637DEDF5-3FCD-4BC2-86A5-7BE2BF01EA38}"/>
+              </a:ext>
+            </a:extLst>
+          </p:cNvPr>
+          <p:cNvSpPr>
+            <a:spLocks noGrp="1"/>
+          </p:cNvSpPr>
+          <p:nvPr>
+            <p:ph type="dt" sz="half" idx="10"/>
+          </p:nvPr>
+        </p:nvSpPr>
+        <p:spPr>
+          <a:xfrm>
+            <a:off x="838200" y="6356350"/>
+            <a:ext cx="2743200" cy="365125"/>
+          </a:xfrm>
+        </p:spPr>
         <p:txBody>
           <a:bodyPr/>
           <a:lstStyle/>
           <a:p>
-            <a:pPr marL="0" indent="0">
-              <a:buNone/>
-            </a:pPr>
-            <a:r>
-              <a:rPr lang="en-US" dirty="0"/>
-              <a:t>Text</a:t>
-            </a:r>
-          </a:p>
-        </p:txBody>
-      </p:sp>
-      <p:sp>
-        <p:nvSpPr>
-          <p:cNvPr id="4" name="Date Placeholder 3">
-            <a:extLst>
-              <a:ext uri="{FF2B5EF4-FFF2-40B4-BE49-F238E27FC236}">
-                <a16:creationId xmlns:a16="http://schemas.microsoft.com/office/drawing/2014/main" id="{893D3077-883B-6B8A-038C-8D607669617A}"/>
-              </a:ext>
-            </a:extLst>
-          </p:cNvPr>
-          <p:cNvSpPr>
-            <a:spLocks noGrp="1"/>
-          </p:cNvSpPr>
-          <p:nvPr>
-            <p:ph type="dt" sz="half" idx="10"/>
-          </p:nvPr>
-        </p:nvSpPr>
-        <p:spPr/>
+            <a:r>
+              <a:rPr lang="en-US"/>
+              <a:t>20XX</a:t>
+            </a:r>
+            <a:endParaRPr lang="en-US" dirty="0"/>
+          </a:p>
+        </p:txBody>
+      </p:sp>
+      <p:sp>
+        <p:nvSpPr>
+          <p:cNvPr id="24" name="Footer Placeholder 23">
+            <a:extLst>
+              <a:ext uri="{FF2B5EF4-FFF2-40B4-BE49-F238E27FC236}">
+                <a16:creationId xmlns:a16="http://schemas.microsoft.com/office/drawing/2014/main" id="{918C3C97-444D-4600-8553-B9C4C1F8483B}"/>
+              </a:ext>
+            </a:extLst>
+          </p:cNvPr>
+          <p:cNvSpPr>
+            <a:spLocks noGrp="1"/>
+          </p:cNvSpPr>
+          <p:nvPr>
+            <p:ph type="ftr" sz="quarter" idx="11"/>
+          </p:nvPr>
+        </p:nvSpPr>
+        <p:spPr>
+          <a:xfrm>
+            <a:off x="4038600" y="6356350"/>
+            <a:ext cx="4114800" cy="365125"/>
+          </a:xfrm>
+        </p:spPr>
         <p:txBody>
           <a:bodyPr/>
           <a:lstStyle/>
           <a:p>
             <a:r>
               <a:rPr lang="en-US"/>
-              <a:t>20XX</a:t>
+              <a:t>PRESENTATION TITLE</a:t>
             </a:r>
             <a:endParaRPr lang="en-US" dirty="0"/>
           </a:p>
@@ -10764,39 +11027,10 @@
       </p:sp>
       <p:sp>
         <p:nvSpPr>
-          <p:cNvPr id="5" name="Footer Placeholder 4">
-            <a:extLst>
-              <a:ext uri="{FF2B5EF4-FFF2-40B4-BE49-F238E27FC236}">
-                <a16:creationId xmlns:a16="http://schemas.microsoft.com/office/drawing/2014/main" id="{85A87815-7458-EE31-C3F6-DB5EB3849A69}"/>
-              </a:ext>
-            </a:extLst>
-          </p:cNvPr>
-          <p:cNvSpPr>
-            <a:spLocks noGrp="1"/>
-          </p:cNvSpPr>
-          <p:nvPr>
-            <p:ph type="ftr" sz="quarter" idx="11"/>
-          </p:nvPr>
-        </p:nvSpPr>
-        <p:spPr/>
-        <p:txBody>
-          <a:bodyPr/>
-          <a:lstStyle/>
-          <a:p>
-            <a:r>
-              <a:rPr lang="en-US"/>
-              <a:t>PRESENTATION TITLE</a:t>
-            </a:r>
-            <a:endParaRPr lang="en-US" dirty="0"/>
-          </a:p>
-        </p:txBody>
-      </p:sp>
-      <p:sp>
-        <p:nvSpPr>
-          <p:cNvPr id="6" name="Slide Number Placeholder 5">
-            <a:extLst>
-              <a:ext uri="{FF2B5EF4-FFF2-40B4-BE49-F238E27FC236}">
-                <a16:creationId xmlns:a16="http://schemas.microsoft.com/office/drawing/2014/main" id="{62F106EA-6BED-61C6-242D-D8156F8E995B}"/>
+          <p:cNvPr id="25" name="Slide Number Placeholder 24">
+            <a:extLst>
+              <a:ext uri="{FF2B5EF4-FFF2-40B4-BE49-F238E27FC236}">
+                <a16:creationId xmlns:a16="http://schemas.microsoft.com/office/drawing/2014/main" id="{148E9129-4CC6-47BA-ACD8-2C632A8660EC}"/>
               </a:ext>
             </a:extLst>
           </p:cNvPr>
@@ -10807,7 +11041,12 @@
             <p:ph type="sldNum" sz="quarter" idx="12"/>
           </p:nvPr>
         </p:nvSpPr>
-        <p:spPr/>
+        <p:spPr>
+          <a:xfrm>
+            <a:off x="8610600" y="6356350"/>
+            <a:ext cx="2743200" cy="365125"/>
+          </a:xfrm>
+        </p:spPr>
         <p:txBody>
           <a:bodyPr/>
           <a:lstStyle/>
@@ -10821,10 +11060,156 @@
           </a:p>
         </p:txBody>
       </p:sp>
+      <p:sp>
+        <p:nvSpPr>
+          <p:cNvPr id="5" name="TextBox 4">
+            <a:extLst>
+              <a:ext uri="{FF2B5EF4-FFF2-40B4-BE49-F238E27FC236}">
+                <a16:creationId xmlns:a16="http://schemas.microsoft.com/office/drawing/2014/main" id="{2254930C-D835-67EE-67EE-F1F5BDA45880}"/>
+              </a:ext>
+            </a:extLst>
+          </p:cNvPr>
+          <p:cNvSpPr txBox="1"/>
+          <p:nvPr/>
+        </p:nvSpPr>
+        <p:spPr>
+          <a:xfrm>
+            <a:off x="1856232" y="2446020"/>
+            <a:ext cx="3520440" cy="523220"/>
+          </a:xfrm>
+          <a:prstGeom prst="rect">
+            <a:avLst/>
+          </a:prstGeom>
+          <a:noFill/>
+        </p:spPr>
+        <p:txBody>
+          <a:bodyPr wrap="square" rtlCol="0">
+            <a:spAutoFit/>
+          </a:bodyPr>
+          <a:lstStyle/>
+          <a:p>
+            <a:pPr algn="ctr"/>
+            <a:r>
+              <a:rPr lang="en-US" sz="2800" b="0" i="0" dirty="0">
+                <a:solidFill>
+                  <a:srgbClr val="202124"/>
+                </a:solidFill>
+                <a:effectLst/>
+                <a:latin typeface="Google Sans"/>
+              </a:rPr>
+              <a:t>Catalent Inc</a:t>
+            </a:r>
+            <a:endParaRPr lang="en-US" sz="2800" dirty="0"/>
+          </a:p>
+        </p:txBody>
+      </p:sp>
+      <p:sp>
+        <p:nvSpPr>
+          <p:cNvPr id="8" name="TextBox 7">
+            <a:extLst>
+              <a:ext uri="{FF2B5EF4-FFF2-40B4-BE49-F238E27FC236}">
+                <a16:creationId xmlns:a16="http://schemas.microsoft.com/office/drawing/2014/main" id="{3FDF9D8D-C677-0576-3FE3-CC3578FA803A}"/>
+              </a:ext>
+            </a:extLst>
+          </p:cNvPr>
+          <p:cNvSpPr txBox="1"/>
+          <p:nvPr/>
+        </p:nvSpPr>
+        <p:spPr>
+          <a:xfrm>
+            <a:off x="6896805" y="2446020"/>
+            <a:ext cx="3520440" cy="523220"/>
+          </a:xfrm>
+          <a:prstGeom prst="rect">
+            <a:avLst/>
+          </a:prstGeom>
+          <a:noFill/>
+        </p:spPr>
+        <p:txBody>
+          <a:bodyPr wrap="square" rtlCol="0">
+            <a:spAutoFit/>
+          </a:bodyPr>
+          <a:lstStyle/>
+          <a:p>
+            <a:pPr algn="ctr"/>
+            <a:r>
+              <a:rPr lang="en-US" sz="2800" b="0" i="0" dirty="0">
+                <a:solidFill>
+                  <a:srgbClr val="202124"/>
+                </a:solidFill>
+                <a:effectLst/>
+                <a:latin typeface="Google Sans"/>
+              </a:rPr>
+              <a:t>Eli Lilly And Co</a:t>
+            </a:r>
+            <a:endParaRPr lang="en-US" sz="2800" dirty="0"/>
+          </a:p>
+        </p:txBody>
+      </p:sp>
+      <p:pic>
+        <p:nvPicPr>
+          <p:cNvPr id="6" name="Picture 5" descr="A graph with numbers and dots&#10;&#10;Description automatically generated">
+            <a:extLst>
+              <a:ext uri="{FF2B5EF4-FFF2-40B4-BE49-F238E27FC236}">
+                <a16:creationId xmlns:a16="http://schemas.microsoft.com/office/drawing/2014/main" id="{15ADADC0-C9CB-2B06-30B3-A550F16D2BE1}"/>
+              </a:ext>
+            </a:extLst>
+          </p:cNvPr>
+          <p:cNvPicPr>
+            <a:picLocks noChangeAspect="1"/>
+          </p:cNvPicPr>
+          <p:nvPr/>
+        </p:nvPicPr>
+        <p:blipFill>
+          <a:blip r:embed="rId2"/>
+          <a:stretch>
+            <a:fillRect/>
+          </a:stretch>
+        </p:blipFill>
+        <p:spPr>
+          <a:xfrm>
+            <a:off x="1424115" y="3090980"/>
+            <a:ext cx="4314569" cy="3235927"/>
+          </a:xfrm>
+          <a:prstGeom prst="rect">
+            <a:avLst/>
+          </a:prstGeom>
+        </p:spPr>
+      </p:pic>
+      <p:pic>
+        <p:nvPicPr>
+          <p:cNvPr id="10" name="Picture 9" descr="A graph with numbers and a line&#10;&#10;Description automatically generated">
+            <a:extLst>
+              <a:ext uri="{FF2B5EF4-FFF2-40B4-BE49-F238E27FC236}">
+                <a16:creationId xmlns:a16="http://schemas.microsoft.com/office/drawing/2014/main" id="{809AC9D6-CE00-738A-324C-0296434FCBD1}"/>
+              </a:ext>
+            </a:extLst>
+          </p:cNvPr>
+          <p:cNvPicPr>
+            <a:picLocks noChangeAspect="1"/>
+          </p:cNvPicPr>
+          <p:nvPr/>
+        </p:nvPicPr>
+        <p:blipFill>
+          <a:blip r:embed="rId3"/>
+          <a:stretch>
+            <a:fillRect/>
+          </a:stretch>
+        </p:blipFill>
+        <p:spPr>
+          <a:xfrm>
+            <a:off x="6499740" y="3120423"/>
+            <a:ext cx="4314570" cy="3235928"/>
+          </a:xfrm>
+          <a:prstGeom prst="rect">
+            <a:avLst/>
+          </a:prstGeom>
+        </p:spPr>
+      </p:pic>
     </p:spTree>
     <p:extLst>
       <p:ext uri="{BB962C8B-B14F-4D97-AF65-F5344CB8AC3E}">
-        <p14:creationId xmlns:p14="http://schemas.microsoft.com/office/powerpoint/2010/main" val="2537772617"/>
+        <p14:creationId xmlns:p14="http://schemas.microsoft.com/office/powerpoint/2010/main" val="1609375222"/>
       </p:ext>
     </p:extLst>
   </p:cSld>
@@ -10853,10 +11238,10 @@
       </p:grpSpPr>
       <p:sp>
         <p:nvSpPr>
-          <p:cNvPr id="3" name="Title 2">
-            <a:extLst>
-              <a:ext uri="{FF2B5EF4-FFF2-40B4-BE49-F238E27FC236}">
-                <a16:creationId xmlns:a16="http://schemas.microsoft.com/office/drawing/2014/main" id="{3E5FEE2D-79E5-4C1D-8BF7-EE619CA7039A}"/>
+          <p:cNvPr id="2" name="Title 1">
+            <a:extLst>
+              <a:ext uri="{FF2B5EF4-FFF2-40B4-BE49-F238E27FC236}">
+                <a16:creationId xmlns:a16="http://schemas.microsoft.com/office/drawing/2014/main" id="{D7370F17-7C63-2740-3929-5264F9B06095}"/>
               </a:ext>
             </a:extLst>
           </p:cNvPr>
@@ -10867,998 +11252,117 @@
             <p:ph type="title"/>
           </p:nvPr>
         </p:nvSpPr>
-        <p:spPr>
-          <a:xfrm>
-            <a:off x="838200" y="134303"/>
-            <a:ext cx="10515600" cy="1325563"/>
-          </a:xfrm>
-        </p:spPr>
+        <p:spPr/>
         <p:txBody>
           <a:bodyPr/>
           <a:lstStyle/>
           <a:p>
             <a:r>
               <a:rPr lang="en-US" dirty="0"/>
-              <a:t>AREAS OF GROWTH</a:t>
-            </a:r>
-          </a:p>
-        </p:txBody>
-      </p:sp>
-      <p:graphicFrame>
-        <p:nvGraphicFramePr>
-          <p:cNvPr id="4" name="Table 4">
-            <a:extLst>
-              <a:ext uri="{FF2B5EF4-FFF2-40B4-BE49-F238E27FC236}">
-                <a16:creationId xmlns:a16="http://schemas.microsoft.com/office/drawing/2014/main" id="{390E7E75-E57A-4FF0-A0E4-A4DBCF6EA89A}"/>
-              </a:ext>
-            </a:extLst>
-          </p:cNvPr>
-          <p:cNvGraphicFramePr>
-            <a:graphicFrameLocks noGrp="1"/>
-          </p:cNvGraphicFramePr>
-          <p:nvPr>
-            <p:ph type="tbl" sz="quarter" idx="14"/>
-            <p:extLst>
-              <p:ext uri="{D42A27DB-BD31-4B8C-83A1-F6EECF244321}">
-                <p14:modId xmlns:p14="http://schemas.microsoft.com/office/powerpoint/2010/main" val="3892965189"/>
-              </p:ext>
-            </p:extLst>
-          </p:nvPr>
-        </p:nvGraphicFramePr>
-        <p:xfrm>
-          <a:off x="838200" y="2111375"/>
-          <a:ext cx="10515600" cy="3570970"/>
-        </p:xfrm>
-        <a:graphic>
-          <a:graphicData uri="http://schemas.openxmlformats.org/drawingml/2006/table">
-            <a:tbl>
-              <a:tblPr firstRow="1" bandRow="1">
-                <a:tableStyleId>{7E9639D4-E3E2-4D34-9284-5A2195B3D0D7}</a:tableStyleId>
-              </a:tblPr>
-              <a:tblGrid>
-                <a:gridCol w="2103120">
-                  <a:extLst>
-                    <a:ext uri="{9D8B030D-6E8A-4147-A177-3AD203B41FA5}">
-                      <a16:colId xmlns:a16="http://schemas.microsoft.com/office/drawing/2014/main" val="3261104555"/>
-                    </a:ext>
-                  </a:extLst>
-                </a:gridCol>
-                <a:gridCol w="2103120">
-                  <a:extLst>
-                    <a:ext uri="{9D8B030D-6E8A-4147-A177-3AD203B41FA5}">
-                      <a16:colId xmlns:a16="http://schemas.microsoft.com/office/drawing/2014/main" val="2547279344"/>
-                    </a:ext>
-                  </a:extLst>
-                </a:gridCol>
-                <a:gridCol w="2103120">
-                  <a:extLst>
-                    <a:ext uri="{9D8B030D-6E8A-4147-A177-3AD203B41FA5}">
-                      <a16:colId xmlns:a16="http://schemas.microsoft.com/office/drawing/2014/main" val="2366228292"/>
-                    </a:ext>
-                  </a:extLst>
-                </a:gridCol>
-                <a:gridCol w="2103120">
-                  <a:extLst>
-                    <a:ext uri="{9D8B030D-6E8A-4147-A177-3AD203B41FA5}">
-                      <a16:colId xmlns:a16="http://schemas.microsoft.com/office/drawing/2014/main" val="934788178"/>
-                    </a:ext>
-                  </a:extLst>
-                </a:gridCol>
-                <a:gridCol w="2103120">
-                  <a:extLst>
-                    <a:ext uri="{9D8B030D-6E8A-4147-A177-3AD203B41FA5}">
-                      <a16:colId xmlns:a16="http://schemas.microsoft.com/office/drawing/2014/main" val="2596635212"/>
-                    </a:ext>
-                  </a:extLst>
-                </a:gridCol>
-              </a:tblGrid>
-              <a:tr h="714194">
-                <a:tc>
-                  <a:txBody>
-                    <a:bodyPr/>
-                    <a:lstStyle/>
-                    <a:p>
-                      <a:pPr algn="ctr" rtl="0" fontAlgn="auto"/>
-                      <a:r>
-                        <a:rPr lang="en-US" sz="1600" b="1" dirty="0">
-                          <a:solidFill>
-                            <a:srgbClr val="FFFFFF"/>
-                          </a:solidFill>
-                          <a:effectLst/>
-                        </a:rPr>
-                        <a:t>​</a:t>
-                      </a:r>
-                      <a:endParaRPr lang="en-US" sz="1600" b="1" i="0" dirty="0">
-                        <a:solidFill>
-                          <a:srgbClr val="FFFFFF"/>
-                        </a:solidFill>
-                        <a:effectLst/>
-                        <a:latin typeface="+mn-lt"/>
-                      </a:endParaRPr>
-                    </a:p>
-                  </a:txBody>
-                  <a:tcPr anchor="ctr"/>
-                </a:tc>
-                <a:tc>
-                  <a:txBody>
-                    <a:bodyPr/>
-                    <a:lstStyle/>
-                    <a:p>
-                      <a:pPr algn="ctr" rtl="0" fontAlgn="base"/>
-                      <a:r>
-                        <a:rPr lang="en-US" sz="1600" b="0" dirty="0">
-                          <a:solidFill>
-                            <a:schemeClr val="accent1"/>
-                          </a:solidFill>
-                          <a:effectLst/>
-                        </a:rPr>
-                        <a:t>CATEGORY 1</a:t>
-                      </a:r>
-                      <a:endParaRPr lang="en-US" sz="1600" b="1" i="0" dirty="0">
-                        <a:solidFill>
-                          <a:schemeClr val="accent1"/>
-                        </a:solidFill>
-                        <a:effectLst/>
-                        <a:latin typeface="+mn-lt"/>
-                      </a:endParaRPr>
-                    </a:p>
-                  </a:txBody>
-                  <a:tcPr anchor="ctr"/>
-                </a:tc>
-                <a:tc>
-                  <a:txBody>
-                    <a:bodyPr/>
-                    <a:lstStyle/>
-                    <a:p>
-                      <a:pPr algn="ctr" rtl="0" fontAlgn="base"/>
-                      <a:r>
-                        <a:rPr lang="en-US" sz="1600" b="0" dirty="0">
-                          <a:solidFill>
-                            <a:schemeClr val="accent1"/>
-                          </a:solidFill>
-                          <a:effectLst/>
-                        </a:rPr>
-                        <a:t>CATEGORY 2</a:t>
-                      </a:r>
-                      <a:endParaRPr lang="en-US" sz="1600" b="1" i="0" dirty="0">
-                        <a:solidFill>
-                          <a:schemeClr val="accent1"/>
-                        </a:solidFill>
-                        <a:effectLst/>
-                        <a:latin typeface="+mn-lt"/>
-                      </a:endParaRPr>
-                    </a:p>
-                  </a:txBody>
-                  <a:tcPr anchor="ctr"/>
-                </a:tc>
-                <a:tc>
-                  <a:txBody>
-                    <a:bodyPr/>
-                    <a:lstStyle/>
-                    <a:p>
-                      <a:pPr algn="ctr" rtl="0" fontAlgn="base"/>
-                      <a:r>
-                        <a:rPr lang="en-US" sz="1600" b="0" kern="1200" dirty="0">
-                          <a:solidFill>
-                            <a:schemeClr val="accent1"/>
-                          </a:solidFill>
-                          <a:effectLst/>
-                        </a:rPr>
-                        <a:t>CATEGORY 3</a:t>
-                      </a:r>
-                      <a:r>
-                        <a:rPr lang="en-US" sz="1600" b="1" dirty="0">
-                          <a:solidFill>
-                            <a:srgbClr val="FFFFFF"/>
-                          </a:solidFill>
-                          <a:effectLst/>
-                        </a:rPr>
-                        <a:t>​</a:t>
-                      </a:r>
-                      <a:endParaRPr lang="en-US" sz="1600" b="1" i="0" dirty="0">
-                        <a:solidFill>
-                          <a:srgbClr val="FFFFFF"/>
-                        </a:solidFill>
-                        <a:effectLst/>
-                        <a:latin typeface="+mn-lt"/>
-                      </a:endParaRPr>
-                    </a:p>
-                  </a:txBody>
-                  <a:tcPr anchor="ctr"/>
-                </a:tc>
-                <a:tc>
-                  <a:txBody>
-                    <a:bodyPr/>
-                    <a:lstStyle/>
-                    <a:p>
-                      <a:pPr algn="ctr" rtl="0" fontAlgn="base"/>
-                      <a:r>
-                        <a:rPr lang="en-US" sz="1600" b="0" kern="1200" dirty="0">
-                          <a:solidFill>
-                            <a:schemeClr val="accent1"/>
-                          </a:solidFill>
-                          <a:effectLst/>
-                        </a:rPr>
-                        <a:t>CATEGORY 4​</a:t>
-                      </a:r>
-                      <a:endParaRPr lang="en-US" sz="1600" b="0" i="0" kern="1200" dirty="0">
-                        <a:solidFill>
-                          <a:schemeClr val="accent1"/>
-                        </a:solidFill>
-                        <a:effectLst/>
-                        <a:latin typeface="+mn-lt"/>
-                        <a:ea typeface="+mn-ea"/>
-                        <a:cs typeface="+mn-cs"/>
-                      </a:endParaRPr>
-                    </a:p>
-                  </a:txBody>
-                  <a:tcPr anchor="ctr"/>
-                </a:tc>
-                <a:extLst>
-                  <a:ext uri="{0D108BD9-81ED-4DB2-BD59-A6C34878D82A}">
-                    <a16:rowId xmlns:a16="http://schemas.microsoft.com/office/drawing/2014/main" val="3441328149"/>
-                  </a:ext>
-                </a:extLst>
-              </a:tr>
-              <a:tr h="714194">
-                <a:tc>
-                  <a:txBody>
-                    <a:bodyPr/>
-                    <a:lstStyle/>
-                    <a:p>
-                      <a:pPr algn="ctr" rtl="0" fontAlgn="base"/>
-                      <a:r>
-                        <a:rPr lang="en-US" sz="1400" b="0" dirty="0">
-                          <a:solidFill>
-                            <a:srgbClr val="333F50"/>
-                          </a:solidFill>
-                          <a:effectLst/>
-                        </a:rPr>
-                        <a:t>Q1</a:t>
-                      </a:r>
-                      <a:endParaRPr lang="en-US" sz="1400" b="0" i="0" dirty="0">
-                        <a:solidFill>
-                          <a:srgbClr val="000000"/>
-                        </a:solidFill>
-                        <a:effectLst/>
-                        <a:latin typeface="+mn-lt"/>
-                      </a:endParaRPr>
-                    </a:p>
-                  </a:txBody>
-                  <a:tcPr anchor="ctr"/>
-                </a:tc>
-                <a:tc>
-                  <a:txBody>
-                    <a:bodyPr/>
-                    <a:lstStyle/>
-                    <a:p>
-                      <a:pPr algn="ctr" rtl="0" fontAlgn="base"/>
-                      <a:r>
-                        <a:rPr lang="en-US" sz="1400" b="0" dirty="0">
-                          <a:solidFill>
-                            <a:srgbClr val="333F50"/>
-                          </a:solidFill>
-                          <a:effectLst/>
-                        </a:rPr>
-                        <a:t>4.5</a:t>
-                      </a:r>
-                      <a:r>
-                        <a:rPr lang="en-US" sz="1400" b="0" dirty="0">
-                          <a:solidFill>
-                            <a:srgbClr val="000000"/>
-                          </a:solidFill>
-                          <a:effectLst/>
-                        </a:rPr>
-                        <a:t>​</a:t>
-                      </a:r>
-                      <a:endParaRPr lang="en-US" sz="1400" b="0" i="0" dirty="0">
-                        <a:solidFill>
-                          <a:srgbClr val="000000"/>
-                        </a:solidFill>
-                        <a:effectLst/>
-                        <a:latin typeface="+mn-lt"/>
-                      </a:endParaRPr>
-                    </a:p>
-                  </a:txBody>
-                  <a:tcPr anchor="ctr"/>
-                </a:tc>
-                <a:tc>
-                  <a:txBody>
-                    <a:bodyPr/>
-                    <a:lstStyle/>
-                    <a:p>
-                      <a:pPr algn="ctr" rtl="0" fontAlgn="base"/>
-                      <a:r>
-                        <a:rPr lang="en-US" sz="1400" b="0" dirty="0">
-                          <a:solidFill>
-                            <a:srgbClr val="333F50"/>
-                          </a:solidFill>
-                          <a:effectLst/>
-                        </a:rPr>
-                        <a:t>2.3</a:t>
-                      </a:r>
-                      <a:r>
-                        <a:rPr lang="en-US" sz="1400" b="0" dirty="0">
-                          <a:solidFill>
-                            <a:srgbClr val="000000"/>
-                          </a:solidFill>
-                          <a:effectLst/>
-                        </a:rPr>
-                        <a:t>​</a:t>
-                      </a:r>
-                      <a:endParaRPr lang="en-US" sz="1400" b="0" i="0" dirty="0">
-                        <a:solidFill>
-                          <a:srgbClr val="000000"/>
-                        </a:solidFill>
-                        <a:effectLst/>
-                        <a:latin typeface="+mn-lt"/>
-                      </a:endParaRPr>
-                    </a:p>
-                  </a:txBody>
-                  <a:tcPr anchor="ctr"/>
-                </a:tc>
-                <a:tc>
-                  <a:txBody>
-                    <a:bodyPr/>
-                    <a:lstStyle/>
-                    <a:p>
-                      <a:pPr algn="ctr" rtl="0" fontAlgn="base"/>
-                      <a:r>
-                        <a:rPr lang="en-US" sz="1400" b="0" dirty="0">
-                          <a:solidFill>
-                            <a:srgbClr val="333F50"/>
-                          </a:solidFill>
-                          <a:effectLst/>
-                        </a:rPr>
-                        <a:t>1.7</a:t>
-                      </a:r>
-                      <a:r>
-                        <a:rPr lang="en-US" sz="1400" b="0" dirty="0">
-                          <a:solidFill>
-                            <a:srgbClr val="000000"/>
-                          </a:solidFill>
-                          <a:effectLst/>
-                        </a:rPr>
-                        <a:t>​</a:t>
-                      </a:r>
-                      <a:endParaRPr lang="en-US" sz="1400" b="0" i="0" dirty="0">
-                        <a:solidFill>
-                          <a:srgbClr val="000000"/>
-                        </a:solidFill>
-                        <a:effectLst/>
-                        <a:latin typeface="+mn-lt"/>
-                      </a:endParaRPr>
-                    </a:p>
-                  </a:txBody>
-                  <a:tcPr anchor="ctr"/>
-                </a:tc>
-                <a:tc>
-                  <a:txBody>
-                    <a:bodyPr/>
-                    <a:lstStyle/>
-                    <a:p>
-                      <a:pPr algn="ctr" rtl="0" fontAlgn="base"/>
-                      <a:r>
-                        <a:rPr lang="en-US" sz="1400" b="0" dirty="0">
-                          <a:solidFill>
-                            <a:srgbClr val="333F50"/>
-                          </a:solidFill>
-                          <a:effectLst/>
-                        </a:rPr>
-                        <a:t>5</a:t>
-                      </a:r>
-                      <a:r>
-                        <a:rPr lang="en-US" sz="1400" b="0" dirty="0">
-                          <a:solidFill>
-                            <a:srgbClr val="000000"/>
-                          </a:solidFill>
-                          <a:effectLst/>
-                        </a:rPr>
-                        <a:t>​.0</a:t>
-                      </a:r>
-                      <a:endParaRPr lang="en-US" sz="1400" b="0" i="0" dirty="0">
-                        <a:solidFill>
-                          <a:srgbClr val="000000"/>
-                        </a:solidFill>
-                        <a:effectLst/>
-                        <a:latin typeface="+mn-lt"/>
-                      </a:endParaRPr>
-                    </a:p>
-                  </a:txBody>
-                  <a:tcPr anchor="ctr"/>
-                </a:tc>
-                <a:extLst>
-                  <a:ext uri="{0D108BD9-81ED-4DB2-BD59-A6C34878D82A}">
-                    <a16:rowId xmlns:a16="http://schemas.microsoft.com/office/drawing/2014/main" val="3134841754"/>
-                  </a:ext>
-                </a:extLst>
-              </a:tr>
-              <a:tr h="714194">
-                <a:tc>
-                  <a:txBody>
-                    <a:bodyPr/>
-                    <a:lstStyle/>
-                    <a:p>
-                      <a:pPr algn="ctr" rtl="0" fontAlgn="base"/>
-                      <a:r>
-                        <a:rPr lang="en-US" sz="1400" b="0" dirty="0">
-                          <a:solidFill>
-                            <a:srgbClr val="333F50"/>
-                          </a:solidFill>
-                          <a:effectLst/>
-                        </a:rPr>
-                        <a:t>Q2</a:t>
-                      </a:r>
-                      <a:endParaRPr lang="en-US" sz="1400" b="0" i="0" dirty="0">
-                        <a:solidFill>
-                          <a:srgbClr val="000000"/>
-                        </a:solidFill>
-                        <a:effectLst/>
-                        <a:latin typeface="+mn-lt"/>
-                      </a:endParaRPr>
-                    </a:p>
-                  </a:txBody>
-                  <a:tcPr anchor="ctr"/>
-                </a:tc>
-                <a:tc>
-                  <a:txBody>
-                    <a:bodyPr/>
-                    <a:lstStyle/>
-                    <a:p>
-                      <a:pPr algn="ctr" rtl="0" fontAlgn="base"/>
-                      <a:r>
-                        <a:rPr lang="en-US" sz="1400" b="0" dirty="0">
-                          <a:solidFill>
-                            <a:srgbClr val="333F50"/>
-                          </a:solidFill>
-                          <a:effectLst/>
-                        </a:rPr>
-                        <a:t>3.2</a:t>
-                      </a:r>
-                      <a:r>
-                        <a:rPr lang="en-US" sz="1400" b="0" dirty="0">
-                          <a:solidFill>
-                            <a:srgbClr val="000000"/>
-                          </a:solidFill>
-                          <a:effectLst/>
-                        </a:rPr>
-                        <a:t>​</a:t>
-                      </a:r>
-                      <a:endParaRPr lang="en-US" sz="1400" b="0" i="0" dirty="0">
-                        <a:solidFill>
-                          <a:srgbClr val="000000"/>
-                        </a:solidFill>
-                        <a:effectLst/>
-                        <a:latin typeface="+mn-lt"/>
-                      </a:endParaRPr>
-                    </a:p>
-                  </a:txBody>
-                  <a:tcPr anchor="ctr"/>
-                </a:tc>
-                <a:tc>
-                  <a:txBody>
-                    <a:bodyPr/>
-                    <a:lstStyle/>
-                    <a:p>
-                      <a:pPr algn="ctr" rtl="0" fontAlgn="base"/>
-                      <a:r>
-                        <a:rPr lang="en-US" sz="1400" b="0" dirty="0">
-                          <a:solidFill>
-                            <a:srgbClr val="333F50"/>
-                          </a:solidFill>
-                          <a:effectLst/>
-                        </a:rPr>
-                        <a:t>5.1</a:t>
-                      </a:r>
-                      <a:r>
-                        <a:rPr lang="en-US" sz="1400" b="0" dirty="0">
-                          <a:solidFill>
-                            <a:srgbClr val="000000"/>
-                          </a:solidFill>
-                          <a:effectLst/>
-                        </a:rPr>
-                        <a:t>​</a:t>
-                      </a:r>
-                      <a:endParaRPr lang="en-US" sz="1400" b="0" i="0" dirty="0">
-                        <a:solidFill>
-                          <a:srgbClr val="000000"/>
-                        </a:solidFill>
-                        <a:effectLst/>
-                        <a:latin typeface="+mn-lt"/>
-                      </a:endParaRPr>
-                    </a:p>
-                  </a:txBody>
-                  <a:tcPr anchor="ctr"/>
-                </a:tc>
-                <a:tc>
-                  <a:txBody>
-                    <a:bodyPr/>
-                    <a:lstStyle/>
-                    <a:p>
-                      <a:pPr algn="ctr" rtl="0" fontAlgn="base"/>
-                      <a:r>
-                        <a:rPr lang="en-US" sz="1400" b="0" dirty="0">
-                          <a:solidFill>
-                            <a:srgbClr val="333F50"/>
-                          </a:solidFill>
-                          <a:effectLst/>
-                        </a:rPr>
-                        <a:t>4.4</a:t>
-                      </a:r>
-                      <a:r>
-                        <a:rPr lang="en-US" sz="1400" b="0" dirty="0">
-                          <a:solidFill>
-                            <a:srgbClr val="000000"/>
-                          </a:solidFill>
-                          <a:effectLst/>
-                        </a:rPr>
-                        <a:t>​</a:t>
-                      </a:r>
-                      <a:endParaRPr lang="en-US" sz="1400" b="0" i="0" dirty="0">
-                        <a:solidFill>
-                          <a:srgbClr val="000000"/>
-                        </a:solidFill>
-                        <a:effectLst/>
-                        <a:latin typeface="+mn-lt"/>
-                      </a:endParaRPr>
-                    </a:p>
-                  </a:txBody>
-                  <a:tcPr anchor="ctr"/>
-                </a:tc>
-                <a:tc>
-                  <a:txBody>
-                    <a:bodyPr/>
-                    <a:lstStyle/>
-                    <a:p>
-                      <a:pPr algn="ctr" rtl="0" fontAlgn="base"/>
-                      <a:r>
-                        <a:rPr lang="en-US" sz="1400" b="0" dirty="0">
-                          <a:solidFill>
-                            <a:srgbClr val="333F50"/>
-                          </a:solidFill>
-                          <a:effectLst/>
-                        </a:rPr>
-                        <a:t>3</a:t>
-                      </a:r>
-                      <a:r>
-                        <a:rPr lang="en-US" sz="1400" b="0" dirty="0">
-                          <a:solidFill>
-                            <a:srgbClr val="000000"/>
-                          </a:solidFill>
-                          <a:effectLst/>
-                        </a:rPr>
-                        <a:t>​.0</a:t>
-                      </a:r>
-                      <a:endParaRPr lang="en-US" sz="1400" b="0" i="0" dirty="0">
-                        <a:solidFill>
-                          <a:srgbClr val="000000"/>
-                        </a:solidFill>
-                        <a:effectLst/>
-                        <a:latin typeface="+mn-lt"/>
-                      </a:endParaRPr>
-                    </a:p>
-                  </a:txBody>
-                  <a:tcPr anchor="ctr"/>
-                </a:tc>
-                <a:extLst>
-                  <a:ext uri="{0D108BD9-81ED-4DB2-BD59-A6C34878D82A}">
-                    <a16:rowId xmlns:a16="http://schemas.microsoft.com/office/drawing/2014/main" val="4129140390"/>
-                  </a:ext>
-                </a:extLst>
-              </a:tr>
-              <a:tr h="714194">
-                <a:tc>
-                  <a:txBody>
-                    <a:bodyPr/>
-                    <a:lstStyle/>
-                    <a:p>
-                      <a:pPr algn="ctr" rtl="0" fontAlgn="base"/>
-                      <a:r>
-                        <a:rPr lang="en-US" sz="1400" b="0" dirty="0">
-                          <a:solidFill>
-                            <a:srgbClr val="333F50"/>
-                          </a:solidFill>
-                          <a:effectLst/>
-                        </a:rPr>
-                        <a:t>Q3</a:t>
-                      </a:r>
-                      <a:endParaRPr lang="en-US" sz="1400" b="0" i="0" dirty="0">
-                        <a:solidFill>
-                          <a:srgbClr val="000000"/>
-                        </a:solidFill>
-                        <a:effectLst/>
-                        <a:latin typeface="+mn-lt"/>
-                      </a:endParaRPr>
-                    </a:p>
-                  </a:txBody>
-                  <a:tcPr anchor="ctr"/>
-                </a:tc>
-                <a:tc>
-                  <a:txBody>
-                    <a:bodyPr/>
-                    <a:lstStyle/>
-                    <a:p>
-                      <a:pPr algn="ctr" rtl="0" fontAlgn="base"/>
-                      <a:r>
-                        <a:rPr lang="en-US" sz="1400" b="0" dirty="0">
-                          <a:solidFill>
-                            <a:srgbClr val="333F50"/>
-                          </a:solidFill>
-                          <a:effectLst/>
-                        </a:rPr>
-                        <a:t>2.1</a:t>
-                      </a:r>
-                      <a:r>
-                        <a:rPr lang="en-US" sz="1400" b="0" dirty="0">
-                          <a:solidFill>
-                            <a:srgbClr val="000000"/>
-                          </a:solidFill>
-                          <a:effectLst/>
-                        </a:rPr>
-                        <a:t>​</a:t>
-                      </a:r>
-                      <a:endParaRPr lang="en-US" sz="1400" b="0" i="0" dirty="0">
-                        <a:solidFill>
-                          <a:srgbClr val="000000"/>
-                        </a:solidFill>
-                        <a:effectLst/>
-                        <a:latin typeface="+mn-lt"/>
-                      </a:endParaRPr>
-                    </a:p>
-                  </a:txBody>
-                  <a:tcPr anchor="ctr"/>
-                </a:tc>
-                <a:tc>
-                  <a:txBody>
-                    <a:bodyPr/>
-                    <a:lstStyle/>
-                    <a:p>
-                      <a:pPr algn="ctr" rtl="0" fontAlgn="base"/>
-                      <a:r>
-                        <a:rPr lang="en-US" sz="1400" b="0" dirty="0">
-                          <a:solidFill>
-                            <a:srgbClr val="333F50"/>
-                          </a:solidFill>
-                          <a:effectLst/>
-                        </a:rPr>
-                        <a:t>1.7</a:t>
-                      </a:r>
-                      <a:r>
-                        <a:rPr lang="en-US" sz="1400" b="0" dirty="0">
-                          <a:solidFill>
-                            <a:srgbClr val="000000"/>
-                          </a:solidFill>
-                          <a:effectLst/>
-                        </a:rPr>
-                        <a:t>​</a:t>
-                      </a:r>
-                      <a:endParaRPr lang="en-US" sz="1400" b="0" i="0" dirty="0">
-                        <a:solidFill>
-                          <a:srgbClr val="000000"/>
-                        </a:solidFill>
-                        <a:effectLst/>
-                        <a:latin typeface="+mn-lt"/>
-                      </a:endParaRPr>
-                    </a:p>
-                  </a:txBody>
-                  <a:tcPr anchor="ctr"/>
-                </a:tc>
-                <a:tc>
-                  <a:txBody>
-                    <a:bodyPr/>
-                    <a:lstStyle/>
-                    <a:p>
-                      <a:pPr algn="ctr" rtl="0" fontAlgn="base"/>
-                      <a:r>
-                        <a:rPr lang="en-US" sz="1400" b="0" dirty="0">
-                          <a:solidFill>
-                            <a:srgbClr val="333F50"/>
-                          </a:solidFill>
-                          <a:effectLst/>
-                        </a:rPr>
-                        <a:t>2.5</a:t>
-                      </a:r>
-                      <a:r>
-                        <a:rPr lang="en-US" sz="1400" b="0" dirty="0">
-                          <a:solidFill>
-                            <a:srgbClr val="000000"/>
-                          </a:solidFill>
-                          <a:effectLst/>
-                        </a:rPr>
-                        <a:t>​</a:t>
-                      </a:r>
-                      <a:endParaRPr lang="en-US" sz="1400" b="0" i="0" dirty="0">
-                        <a:solidFill>
-                          <a:srgbClr val="000000"/>
-                        </a:solidFill>
-                        <a:effectLst/>
-                        <a:latin typeface="+mn-lt"/>
-                      </a:endParaRPr>
-                    </a:p>
-                  </a:txBody>
-                  <a:tcPr anchor="ctr"/>
-                </a:tc>
-                <a:tc>
-                  <a:txBody>
-                    <a:bodyPr/>
-                    <a:lstStyle/>
-                    <a:p>
-                      <a:pPr algn="ctr" rtl="0" fontAlgn="base"/>
-                      <a:r>
-                        <a:rPr lang="en-US" sz="1400" b="0" dirty="0">
-                          <a:solidFill>
-                            <a:srgbClr val="333F50"/>
-                          </a:solidFill>
-                          <a:effectLst/>
-                        </a:rPr>
-                        <a:t>2.8</a:t>
-                      </a:r>
-                      <a:r>
-                        <a:rPr lang="en-US" sz="1400" b="0" dirty="0">
-                          <a:solidFill>
-                            <a:srgbClr val="000000"/>
-                          </a:solidFill>
-                          <a:effectLst/>
-                        </a:rPr>
-                        <a:t>​</a:t>
-                      </a:r>
-                      <a:endParaRPr lang="en-US" sz="1400" b="0" i="0" dirty="0">
-                        <a:solidFill>
-                          <a:srgbClr val="000000"/>
-                        </a:solidFill>
-                        <a:effectLst/>
-                        <a:latin typeface="+mn-lt"/>
-                      </a:endParaRPr>
-                    </a:p>
-                  </a:txBody>
-                  <a:tcPr anchor="ctr"/>
-                </a:tc>
-                <a:extLst>
-                  <a:ext uri="{0D108BD9-81ED-4DB2-BD59-A6C34878D82A}">
-                    <a16:rowId xmlns:a16="http://schemas.microsoft.com/office/drawing/2014/main" val="1699990805"/>
-                  </a:ext>
-                </a:extLst>
-              </a:tr>
-              <a:tr h="714194">
-                <a:tc>
-                  <a:txBody>
-                    <a:bodyPr/>
-                    <a:lstStyle/>
-                    <a:p>
-                      <a:pPr algn="ctr" rtl="0" fontAlgn="base"/>
-                      <a:r>
-                        <a:rPr lang="en-US" sz="1400" b="0" dirty="0">
-                          <a:solidFill>
-                            <a:srgbClr val="333F50"/>
-                          </a:solidFill>
-                          <a:effectLst/>
-                        </a:rPr>
-                        <a:t>Q4</a:t>
-                      </a:r>
-                      <a:endParaRPr lang="en-US" sz="1400" b="0" i="0" dirty="0">
-                        <a:solidFill>
-                          <a:srgbClr val="000000"/>
-                        </a:solidFill>
-                        <a:effectLst/>
-                        <a:latin typeface="+mn-lt"/>
-                      </a:endParaRPr>
-                    </a:p>
-                  </a:txBody>
-                  <a:tcPr anchor="ctr"/>
-                </a:tc>
-                <a:tc>
-                  <a:txBody>
-                    <a:bodyPr/>
-                    <a:lstStyle/>
-                    <a:p>
-                      <a:pPr algn="ctr" rtl="0" fontAlgn="base"/>
-                      <a:r>
-                        <a:rPr lang="en-US" sz="1400" b="0" dirty="0">
-                          <a:solidFill>
-                            <a:srgbClr val="333F50"/>
-                          </a:solidFill>
-                          <a:effectLst/>
-                        </a:rPr>
-                        <a:t>4.5</a:t>
-                      </a:r>
-                      <a:r>
-                        <a:rPr lang="en-US" sz="1400" b="0" dirty="0">
-                          <a:solidFill>
-                            <a:srgbClr val="000000"/>
-                          </a:solidFill>
-                          <a:effectLst/>
-                        </a:rPr>
-                        <a:t>​</a:t>
-                      </a:r>
-                      <a:endParaRPr lang="en-US" sz="1400" b="0" i="0" dirty="0">
-                        <a:solidFill>
-                          <a:srgbClr val="000000"/>
-                        </a:solidFill>
-                        <a:effectLst/>
-                        <a:latin typeface="+mn-lt"/>
-                      </a:endParaRPr>
-                    </a:p>
-                  </a:txBody>
-                  <a:tcPr anchor="ctr"/>
-                </a:tc>
-                <a:tc>
-                  <a:txBody>
-                    <a:bodyPr/>
-                    <a:lstStyle/>
-                    <a:p>
-                      <a:pPr algn="ctr" rtl="0" fontAlgn="base"/>
-                      <a:r>
-                        <a:rPr lang="en-US" sz="1400" b="0" dirty="0">
-                          <a:solidFill>
-                            <a:srgbClr val="333F50"/>
-                          </a:solidFill>
-                          <a:effectLst/>
-                        </a:rPr>
-                        <a:t>2.2</a:t>
-                      </a:r>
-                      <a:r>
-                        <a:rPr lang="en-US" sz="1400" b="0" dirty="0">
-                          <a:solidFill>
-                            <a:srgbClr val="000000"/>
-                          </a:solidFill>
-                          <a:effectLst/>
-                        </a:rPr>
-                        <a:t>​</a:t>
-                      </a:r>
-                      <a:endParaRPr lang="en-US" sz="1400" b="0" i="0" dirty="0">
-                        <a:solidFill>
-                          <a:srgbClr val="000000"/>
-                        </a:solidFill>
-                        <a:effectLst/>
-                        <a:latin typeface="+mn-lt"/>
-                      </a:endParaRPr>
-                    </a:p>
-                  </a:txBody>
-                  <a:tcPr anchor="ctr"/>
-                </a:tc>
-                <a:tc>
-                  <a:txBody>
-                    <a:bodyPr/>
-                    <a:lstStyle/>
-                    <a:p>
-                      <a:pPr algn="ctr" rtl="0" fontAlgn="base"/>
-                      <a:r>
-                        <a:rPr lang="en-US" sz="1400" b="0" dirty="0">
-                          <a:solidFill>
-                            <a:srgbClr val="333F50"/>
-                          </a:solidFill>
-                          <a:effectLst/>
-                        </a:rPr>
-                        <a:t>1.7</a:t>
-                      </a:r>
-                      <a:r>
-                        <a:rPr lang="en-US" sz="1400" b="0" dirty="0">
-                          <a:solidFill>
-                            <a:srgbClr val="000000"/>
-                          </a:solidFill>
-                          <a:effectLst/>
-                        </a:rPr>
-                        <a:t>​</a:t>
-                      </a:r>
-                      <a:endParaRPr lang="en-US" sz="1400" b="0" i="0" dirty="0">
-                        <a:solidFill>
-                          <a:srgbClr val="000000"/>
-                        </a:solidFill>
-                        <a:effectLst/>
-                        <a:latin typeface="+mn-lt"/>
-                      </a:endParaRPr>
-                    </a:p>
-                  </a:txBody>
-                  <a:tcPr anchor="ctr"/>
-                </a:tc>
-                <a:tc>
-                  <a:txBody>
-                    <a:bodyPr/>
-                    <a:lstStyle/>
-                    <a:p>
-                      <a:pPr algn="ctr" rtl="0" fontAlgn="base"/>
-                      <a:r>
-                        <a:rPr lang="en-US" sz="1400" b="0" dirty="0">
-                          <a:solidFill>
-                            <a:srgbClr val="333F50"/>
-                          </a:solidFill>
-                          <a:effectLst/>
-                        </a:rPr>
-                        <a:t>7.0</a:t>
-                      </a:r>
-                      <a:endParaRPr lang="en-US" sz="1400" b="0" i="0" dirty="0">
-                        <a:solidFill>
-                          <a:srgbClr val="000000"/>
-                        </a:solidFill>
-                        <a:effectLst/>
-                        <a:latin typeface="+mn-lt"/>
-                      </a:endParaRPr>
-                    </a:p>
-                  </a:txBody>
-                  <a:tcPr anchor="ctr"/>
-                </a:tc>
-                <a:extLst>
-                  <a:ext uri="{0D108BD9-81ED-4DB2-BD59-A6C34878D82A}">
-                    <a16:rowId xmlns:a16="http://schemas.microsoft.com/office/drawing/2014/main" val="3388671141"/>
-                  </a:ext>
-                </a:extLst>
-              </a:tr>
-            </a:tbl>
-          </a:graphicData>
-        </a:graphic>
-      </p:graphicFrame>
-      <p:sp>
-        <p:nvSpPr>
-          <p:cNvPr id="7" name="Date Placeholder 6">
-            <a:extLst>
-              <a:ext uri="{FF2B5EF4-FFF2-40B4-BE49-F238E27FC236}">
-                <a16:creationId xmlns:a16="http://schemas.microsoft.com/office/drawing/2014/main" id="{E7F1AE66-47AA-4110-86B9-0626D4953989}"/>
-              </a:ext>
-            </a:extLst>
-          </p:cNvPr>
-          <p:cNvSpPr>
-            <a:spLocks noGrp="1"/>
-          </p:cNvSpPr>
-          <p:nvPr>
-            <p:ph type="dt" sz="half" idx="10"/>
-          </p:nvPr>
-        </p:nvSpPr>
-        <p:spPr>
-          <a:xfrm>
-            <a:off x="838200" y="6356350"/>
-            <a:ext cx="2743200" cy="365125"/>
-          </a:xfrm>
-        </p:spPr>
+              <a:t>How can we predict future trends?</a:t>
+            </a:r>
+            <a:br>
+              <a:rPr lang="en-US" dirty="0"/>
+            </a:br>
+            <a:endParaRPr lang="en-US" dirty="0"/>
+          </a:p>
+        </p:txBody>
+      </p:sp>
+      <p:sp>
+        <p:nvSpPr>
+          <p:cNvPr id="3" name="SmartArt Placeholder 2">
+            <a:extLst>
+              <a:ext uri="{FF2B5EF4-FFF2-40B4-BE49-F238E27FC236}">
+                <a16:creationId xmlns:a16="http://schemas.microsoft.com/office/drawing/2014/main" id="{204115AA-6716-606A-E787-021915C3FAAB}"/>
+              </a:ext>
+            </a:extLst>
+          </p:cNvPr>
+          <p:cNvSpPr>
+            <a:spLocks noGrp="1"/>
+          </p:cNvSpPr>
+          <p:nvPr>
+            <p:ph type="dgm" sz="quarter" idx="15"/>
+          </p:nvPr>
+        </p:nvSpPr>
+        <p:spPr/>
         <p:txBody>
           <a:bodyPr/>
           <a:lstStyle/>
           <a:p>
+            <a:pPr marL="0" indent="0">
+              <a:buNone/>
+            </a:pPr>
             <a:r>
               <a:rPr lang="en-US" dirty="0"/>
-              <a:t>20XX</a:t>
-            </a:r>
-          </a:p>
-        </p:txBody>
-      </p:sp>
-      <p:sp>
-        <p:nvSpPr>
-          <p:cNvPr id="8" name="Footer Placeholder 7">
-            <a:extLst>
-              <a:ext uri="{FF2B5EF4-FFF2-40B4-BE49-F238E27FC236}">
-                <a16:creationId xmlns:a16="http://schemas.microsoft.com/office/drawing/2014/main" id="{8BA5A93F-DCAE-40B8-8E94-3239A1A6A21A}"/>
-              </a:ext>
-            </a:extLst>
-          </p:cNvPr>
-          <p:cNvSpPr>
-            <a:spLocks noGrp="1"/>
-          </p:cNvSpPr>
-          <p:nvPr>
-            <p:ph type="ftr" sz="quarter" idx="11"/>
-          </p:nvPr>
-        </p:nvSpPr>
-        <p:spPr>
-          <a:xfrm>
-            <a:off x="4038600" y="6356350"/>
-            <a:ext cx="4114800" cy="365125"/>
-          </a:xfrm>
-        </p:spPr>
+              <a:t>Text &amp; Graphs</a:t>
+            </a:r>
+          </a:p>
+        </p:txBody>
+      </p:sp>
+      <p:sp>
+        <p:nvSpPr>
+          <p:cNvPr id="4" name="Date Placeholder 3">
+            <a:extLst>
+              <a:ext uri="{FF2B5EF4-FFF2-40B4-BE49-F238E27FC236}">
+                <a16:creationId xmlns:a16="http://schemas.microsoft.com/office/drawing/2014/main" id="{893D3077-883B-6B8A-038C-8D607669617A}"/>
+              </a:ext>
+            </a:extLst>
+          </p:cNvPr>
+          <p:cNvSpPr>
+            <a:spLocks noGrp="1"/>
+          </p:cNvSpPr>
+          <p:nvPr>
+            <p:ph type="dt" sz="half" idx="10"/>
+          </p:nvPr>
+        </p:nvSpPr>
+        <p:spPr/>
         <p:txBody>
           <a:bodyPr/>
           <a:lstStyle/>
           <a:p>
             <a:r>
-              <a:rPr lang="en-US" dirty="0"/>
+              <a:rPr lang="en-US"/>
+              <a:t>20XX</a:t>
+            </a:r>
+            <a:endParaRPr lang="en-US" dirty="0"/>
+          </a:p>
+        </p:txBody>
+      </p:sp>
+      <p:sp>
+        <p:nvSpPr>
+          <p:cNvPr id="5" name="Footer Placeholder 4">
+            <a:extLst>
+              <a:ext uri="{FF2B5EF4-FFF2-40B4-BE49-F238E27FC236}">
+                <a16:creationId xmlns:a16="http://schemas.microsoft.com/office/drawing/2014/main" id="{85A87815-7458-EE31-C3F6-DB5EB3849A69}"/>
+              </a:ext>
+            </a:extLst>
+          </p:cNvPr>
+          <p:cNvSpPr>
+            <a:spLocks noGrp="1"/>
+          </p:cNvSpPr>
+          <p:nvPr>
+            <p:ph type="ftr" sz="quarter" idx="11"/>
+          </p:nvPr>
+        </p:nvSpPr>
+        <p:spPr/>
+        <p:txBody>
+          <a:bodyPr/>
+          <a:lstStyle/>
+          <a:p>
+            <a:r>
+              <a:rPr lang="en-US"/>
               <a:t>PRESENTATION TITLE</a:t>
             </a:r>
-          </a:p>
-        </p:txBody>
-      </p:sp>
-      <p:sp>
-        <p:nvSpPr>
-          <p:cNvPr id="9" name="Slide Number Placeholder 8">
-            <a:extLst>
-              <a:ext uri="{FF2B5EF4-FFF2-40B4-BE49-F238E27FC236}">
-                <a16:creationId xmlns:a16="http://schemas.microsoft.com/office/drawing/2014/main" id="{03091613-153A-4005-9F4D-2F185AE5F7BF}"/>
+            <a:endParaRPr lang="en-US" dirty="0"/>
+          </a:p>
+        </p:txBody>
+      </p:sp>
+      <p:sp>
+        <p:nvSpPr>
+          <p:cNvPr id="6" name="Slide Number Placeholder 5">
+            <a:extLst>
+              <a:ext uri="{FF2B5EF4-FFF2-40B4-BE49-F238E27FC236}">
+                <a16:creationId xmlns:a16="http://schemas.microsoft.com/office/drawing/2014/main" id="{62F106EA-6BED-61C6-242D-D8156F8E995B}"/>
               </a:ext>
             </a:extLst>
           </p:cNvPr>
@@ -11869,12 +11373,7 @@
             <p:ph type="sldNum" sz="quarter" idx="12"/>
           </p:nvPr>
         </p:nvSpPr>
-        <p:spPr>
-          <a:xfrm>
-            <a:off x="8610600" y="6356350"/>
-            <a:ext cx="2743200" cy="365125"/>
-          </a:xfrm>
-        </p:spPr>
+        <p:spPr/>
         <p:txBody>
           <a:bodyPr/>
           <a:lstStyle/>
@@ -11891,7 +11390,7 @@
     </p:spTree>
     <p:extLst>
       <p:ext uri="{BB962C8B-B14F-4D97-AF65-F5344CB8AC3E}">
-        <p14:creationId xmlns:p14="http://schemas.microsoft.com/office/powerpoint/2010/main" val="2499682613"/>
+        <p14:creationId xmlns:p14="http://schemas.microsoft.com/office/powerpoint/2010/main" val="2537772617"/>
       </p:ext>
     </p:extLst>
   </p:cSld>
@@ -12904,6 +12403,15 @@
 </file>
 
 <file path=customXml/item1.xml><?xml version="1.0" encoding="utf-8"?>
+<?mso-contentType ?>
+<FormTemplates xmlns="http://schemas.microsoft.com/sharepoint/v3/contenttype/forms">
+  <Display>DocumentLibraryForm</Display>
+  <Edit>DocumentLibraryForm</Edit>
+  <New>DocumentLibraryForm</New>
+</FormTemplates>
+</file>
+
+<file path=customXml/item2.xml><?xml version="1.0" encoding="utf-8"?>
 <p:properties xmlns:p="http://schemas.microsoft.com/office/2006/metadata/properties" xmlns:xsi="http://www.w3.org/2001/XMLSchema-instance" xmlns:pc="http://schemas.microsoft.com/office/infopath/2007/PartnerControls">
   <documentManagement>
     <_ip_UnifiedCompliancePolicyUIAction xmlns="http://schemas.microsoft.com/sharepoint/v3" xsi:nil="true"/>
@@ -12921,15 +12429,6 @@
     <MediaServiceKeyPoints xmlns="71af3243-3dd4-4a8d-8c0d-dd76da1f02a5" xsi:nil="true"/>
   </documentManagement>
 </p:properties>
-</file>
-
-<file path=customXml/item2.xml><?xml version="1.0" encoding="utf-8"?>
-<?mso-contentType ?>
-<FormTemplates xmlns="http://schemas.microsoft.com/sharepoint/v3/contenttype/forms">
-  <Display>DocumentLibraryForm</Display>
-  <Edit>DocumentLibraryForm</Edit>
-  <New>DocumentLibraryForm</New>
-</FormTemplates>
 </file>
 
 <file path=customXml/item3.xml><?xml version="1.0" encoding="utf-8"?>
@@ -13245,6 +12744,14 @@
 </file>
 
 <file path=customXml/itemProps1.xml><?xml version="1.0" encoding="utf-8"?>
+<ds:datastoreItem xmlns:ds="http://schemas.openxmlformats.org/officeDocument/2006/customXml" ds:itemID="{5ECBB7AC-E012-4960-B083-33C7C7C0C8C8}">
+  <ds:schemaRefs>
+    <ds:schemaRef ds:uri="http://schemas.microsoft.com/sharepoint/v3/contenttype/forms"/>
+  </ds:schemaRefs>
+</ds:datastoreItem>
+</file>
+
+<file path=customXml/itemProps2.xml><?xml version="1.0" encoding="utf-8"?>
 <ds:datastoreItem xmlns:ds="http://schemas.openxmlformats.org/officeDocument/2006/customXml" ds:itemID="{CA05327A-3F11-4B74-87F2-F91762B92A4E}">
   <ds:schemaRefs>
     <ds:schemaRef ds:uri="http://schemas.microsoft.com/office/2006/metadata/properties"/>
@@ -13252,14 +12759,6 @@
     <ds:schemaRef ds:uri="http://schemas.microsoft.com/sharepoint/v3"/>
     <ds:schemaRef ds:uri="71af3243-3dd4-4a8d-8c0d-dd76da1f02a5"/>
     <ds:schemaRef ds:uri="230e9df3-be65-4c73-a93b-d1236ebd677e"/>
-  </ds:schemaRefs>
-</ds:datastoreItem>
-</file>
-
-<file path=customXml/itemProps2.xml><?xml version="1.0" encoding="utf-8"?>
-<ds:datastoreItem xmlns:ds="http://schemas.openxmlformats.org/officeDocument/2006/customXml" ds:itemID="{5ECBB7AC-E012-4960-B083-33C7C7C0C8C8}">
-  <ds:schemaRefs>
-    <ds:schemaRef ds:uri="http://schemas.microsoft.com/sharepoint/v3/contenttype/forms"/>
   </ds:schemaRefs>
 </ds:datastoreItem>
 </file>

</xml_diff>

<commit_message>
ppt and ignore update
</commit_message>
<xml_diff>
--- a/Powerpoint.pptx
+++ b/Powerpoint.pptx
@@ -12682,15 +12682,6 @@
 </file>
 
 <file path=customXml/item2.xml><?xml version="1.0" encoding="utf-8"?>
-<?mso-contentType ?>
-<FormTemplates xmlns="http://schemas.microsoft.com/sharepoint/v3/contenttype/forms">
-  <Display>DocumentLibraryForm</Display>
-  <Edit>DocumentLibraryForm</Edit>
-  <New>DocumentLibraryForm</New>
-</FormTemplates>
-</file>
-
-<file path=customXml/item3.xml><?xml version="1.0" encoding="utf-8"?>
 <ct:contentTypeSchema xmlns:ct="http://schemas.microsoft.com/office/2006/metadata/contentType" xmlns:ma="http://schemas.microsoft.com/office/2006/metadata/properties/metaAttributes" ct:_="" ma:_="" ma:contentTypeName="Document" ma:contentTypeID="0x01010079F111ED35F8CC479449609E8A0923A6" ma:contentTypeVersion="28" ma:contentTypeDescription="Create a new document." ma:contentTypeScope="" ma:versionID="60f5a4f2d2b0abadcf532d48ebf9cb71">
   <xsd:schema xmlns:xsd="http://www.w3.org/2001/XMLSchema" xmlns:xs="http://www.w3.org/2001/XMLSchema" xmlns:p="http://schemas.microsoft.com/office/2006/metadata/properties" xmlns:ns1="http://schemas.microsoft.com/sharepoint/v3" xmlns:ns2="71af3243-3dd4-4a8d-8c0d-dd76da1f02a5" xmlns:ns3="16c05727-aa75-4e4a-9b5f-8a80a1165891" xmlns:ns4="230e9df3-be65-4c73-a93b-d1236ebd677e" targetNamespace="http://schemas.microsoft.com/office/2006/metadata/properties" ma:root="true" ma:fieldsID="7dd78129e6a1811f84807ad11c651531" ns1:_="" ns2:_="" ns3:_="" ns4:_="">
     <xsd:import namespace="http://schemas.microsoft.com/sharepoint/v3"/>
@@ -13002,6 +12993,15 @@
 </ct:contentTypeSchema>
 </file>
 
+<file path=customXml/item3.xml><?xml version="1.0" encoding="utf-8"?>
+<?mso-contentType ?>
+<FormTemplates xmlns="http://schemas.microsoft.com/sharepoint/v3/contenttype/forms">
+  <Display>DocumentLibraryForm</Display>
+  <Edit>DocumentLibraryForm</Edit>
+  <New>DocumentLibraryForm</New>
+</FormTemplates>
+</file>
+
 <file path=customXml/itemProps1.xml><?xml version="1.0" encoding="utf-8"?>
 <ds:datastoreItem xmlns:ds="http://schemas.openxmlformats.org/officeDocument/2006/customXml" ds:itemID="{CA05327A-3F11-4B74-87F2-F91762B92A4E}">
   <ds:schemaRefs>
@@ -13015,14 +13015,6 @@
 </file>
 
 <file path=customXml/itemProps2.xml><?xml version="1.0" encoding="utf-8"?>
-<ds:datastoreItem xmlns:ds="http://schemas.openxmlformats.org/officeDocument/2006/customXml" ds:itemID="{5ECBB7AC-E012-4960-B083-33C7C7C0C8C8}">
-  <ds:schemaRefs>
-    <ds:schemaRef ds:uri="http://schemas.microsoft.com/sharepoint/v3/contenttype/forms"/>
-  </ds:schemaRefs>
-</ds:datastoreItem>
-</file>
-
-<file path=customXml/itemProps3.xml><?xml version="1.0" encoding="utf-8"?>
 <ds:datastoreItem xmlns:ds="http://schemas.openxmlformats.org/officeDocument/2006/customXml" ds:itemID="{676A8F61-3FE0-4499-9D74-D8DA5DD8FDFC}">
   <ds:schemaRefs>
     <ds:schemaRef ds:uri="http://schemas.microsoft.com/office/2006/metadata/contentType"/>
@@ -13043,6 +13035,14 @@
 </ds:datastoreItem>
 </file>
 
+<file path=customXml/itemProps3.xml><?xml version="1.0" encoding="utf-8"?>
+<ds:datastoreItem xmlns:ds="http://schemas.openxmlformats.org/officeDocument/2006/customXml" ds:itemID="{5ECBB7AC-E012-4960-B083-33C7C7C0C8C8}">
+  <ds:schemaRefs>
+    <ds:schemaRef ds:uri="http://schemas.microsoft.com/sharepoint/v3/contenttype/forms"/>
+  </ds:schemaRefs>
+</ds:datastoreItem>
+</file>
+
 <file path=docMetadata/LabelInfo.xml><?xml version="1.0" encoding="utf-8"?>
 <clbl:labelList xmlns:clbl="http://schemas.microsoft.com/office/2020/mipLabelMetadata"/>
 </file>
</xml_diff>